<commit_message>
Fixed link on github
</commit_message>
<xml_diff>
--- a/docs/CALCULATOR-MANUAL.pptx
+++ b/docs/CALCULATOR-MANUAL.pptx
@@ -226,7 +226,7 @@
           <a:p>
             <a:fld id="{A223222F-35F1-BF46-BCCE-BAB3F293F7CE}" type="datetimeFigureOut">
               <a:rPr lang="en-US" smtClean="0"/>
-              <a:t>9/9/17</a:t>
+              <a:t>9/11/17</a:t>
             </a:fld>
             <a:endParaRPr lang="en-US"/>
           </a:p>
@@ -675,7 +675,7 @@
           <a:p>
             <a:fld id="{2E2DCCB5-7673-4B4F-B91B-65A21A4130E3}" type="datetimeFigureOut">
               <a:rPr lang="es-ES" smtClean="0"/>
-              <a:t>9/9/17</a:t>
+              <a:t>11/9/17</a:t>
             </a:fld>
             <a:endParaRPr lang="en-US"/>
           </a:p>
@@ -845,7 +845,7 @@
           <a:p>
             <a:fld id="{2E2DCCB5-7673-4B4F-B91B-65A21A4130E3}" type="datetimeFigureOut">
               <a:rPr lang="es-ES" smtClean="0"/>
-              <a:t>9/9/17</a:t>
+              <a:t>11/9/17</a:t>
             </a:fld>
             <a:endParaRPr lang="en-US"/>
           </a:p>
@@ -1025,7 +1025,7 @@
           <a:p>
             <a:fld id="{2E2DCCB5-7673-4B4F-B91B-65A21A4130E3}" type="datetimeFigureOut">
               <a:rPr lang="es-ES" smtClean="0"/>
-              <a:t>9/9/17</a:t>
+              <a:t>11/9/17</a:t>
             </a:fld>
             <a:endParaRPr lang="en-US"/>
           </a:p>
@@ -1195,7 +1195,7 @@
           <a:p>
             <a:fld id="{2E2DCCB5-7673-4B4F-B91B-65A21A4130E3}" type="datetimeFigureOut">
               <a:rPr lang="es-ES" smtClean="0"/>
-              <a:t>9/9/17</a:t>
+              <a:t>11/9/17</a:t>
             </a:fld>
             <a:endParaRPr lang="en-US"/>
           </a:p>
@@ -1441,7 +1441,7 @@
           <a:p>
             <a:fld id="{2E2DCCB5-7673-4B4F-B91B-65A21A4130E3}" type="datetimeFigureOut">
               <a:rPr lang="es-ES" smtClean="0"/>
-              <a:t>9/9/17</a:t>
+              <a:t>11/9/17</a:t>
             </a:fld>
             <a:endParaRPr lang="en-US"/>
           </a:p>
@@ -1729,7 +1729,7 @@
           <a:p>
             <a:fld id="{2E2DCCB5-7673-4B4F-B91B-65A21A4130E3}" type="datetimeFigureOut">
               <a:rPr lang="es-ES" smtClean="0"/>
-              <a:t>9/9/17</a:t>
+              <a:t>11/9/17</a:t>
             </a:fld>
             <a:endParaRPr lang="en-US"/>
           </a:p>
@@ -2151,7 +2151,7 @@
           <a:p>
             <a:fld id="{2E2DCCB5-7673-4B4F-B91B-65A21A4130E3}" type="datetimeFigureOut">
               <a:rPr lang="es-ES" smtClean="0"/>
-              <a:t>9/9/17</a:t>
+              <a:t>11/9/17</a:t>
             </a:fld>
             <a:endParaRPr lang="en-US"/>
           </a:p>
@@ -2269,7 +2269,7 @@
           <a:p>
             <a:fld id="{2E2DCCB5-7673-4B4F-B91B-65A21A4130E3}" type="datetimeFigureOut">
               <a:rPr lang="es-ES" smtClean="0"/>
-              <a:t>9/9/17</a:t>
+              <a:t>11/9/17</a:t>
             </a:fld>
             <a:endParaRPr lang="en-US"/>
           </a:p>
@@ -2364,7 +2364,7 @@
           <a:p>
             <a:fld id="{2E2DCCB5-7673-4B4F-B91B-65A21A4130E3}" type="datetimeFigureOut">
               <a:rPr lang="es-ES" smtClean="0"/>
-              <a:t>9/9/17</a:t>
+              <a:t>11/9/17</a:t>
             </a:fld>
             <a:endParaRPr lang="en-US"/>
           </a:p>
@@ -2641,7 +2641,7 @@
           <a:p>
             <a:fld id="{2E2DCCB5-7673-4B4F-B91B-65A21A4130E3}" type="datetimeFigureOut">
               <a:rPr lang="es-ES" smtClean="0"/>
-              <a:t>9/9/17</a:t>
+              <a:t>11/9/17</a:t>
             </a:fld>
             <a:endParaRPr lang="en-US"/>
           </a:p>
@@ -2894,7 +2894,7 @@
           <a:p>
             <a:fld id="{2E2DCCB5-7673-4B4F-B91B-65A21A4130E3}" type="datetimeFigureOut">
               <a:rPr lang="es-ES" smtClean="0"/>
-              <a:t>9/9/17</a:t>
+              <a:t>11/9/17</a:t>
             </a:fld>
             <a:endParaRPr lang="en-US"/>
           </a:p>
@@ -3137,7 +3137,7 @@
           <a:p>
             <a:fld id="{2E2DCCB5-7673-4B4F-B91B-65A21A4130E3}" type="datetimeFigureOut">
               <a:rPr lang="es-ES" smtClean="0"/>
-              <a:t>9/9/17</a:t>
+              <a:t>11/9/17</a:t>
             </a:fld>
             <a:endParaRPr lang="en-US"/>
           </a:p>
@@ -8531,30 +8531,13 @@
               <a:rPr lang="en-US" dirty="0">
                 <a:hlinkClick r:id="rId2"/>
               </a:rPr>
-              <a:t>/</a:t>
-            </a:r>
-            <a:r>
-              <a:rPr lang="en-US" dirty="0" err="1">
-                <a:hlinkClick r:id="rId2"/>
-              </a:rPr>
-              <a:t>AppliedMechanics</a:t>
-            </a:r>
-            <a:r>
-              <a:rPr lang="en-US" dirty="0">
-                <a:hlinkClick r:id="rId2"/>
-              </a:rPr>
-              <a:t>-EAFIT/</a:t>
-            </a:r>
-            <a:r>
-              <a:rPr lang="en-US" dirty="0" err="1">
-                <a:hlinkClick r:id="rId2"/>
-              </a:rPr>
-              <a:t>SolidsPy</a:t>
+              <a:t>/jgomezc1/Elastic-Calculator</a:t>
             </a:r>
             <a:r>
               <a:rPr lang="en-US" dirty="0"/>
               <a:t>)</a:t>
             </a:r>
+            <a:endParaRPr lang="en-US" dirty="0"/>
           </a:p>
         </p:txBody>
       </p:sp>
@@ -8822,11 +8805,7 @@
             </a:r>
             <a:r>
               <a:rPr lang="en-US" dirty="0" smtClean="0"/>
-              <a:t> </a:t>
-            </a:r>
-            <a:r>
-              <a:rPr lang="en-US" dirty="0" smtClean="0"/>
-              <a:t>la </a:t>
+              <a:t> la </a:t>
             </a:r>
             <a:r>
               <a:rPr lang="en-US" dirty="0" err="1" smtClean="0"/>
@@ -11724,7 +11703,7 @@
           <a:graphicData uri="http://schemas.openxmlformats.org/presentationml/2006/ole">
             <mc:AlternateContent xmlns:mc="http://schemas.openxmlformats.org/markup-compatibility/2006">
               <mc:Choice xmlns:v="urn:schemas-microsoft-com:vml" Requires="v">
-                <p:oleObj spid="_x0000_s32699" name="Equation" r:id="rId3" imgW="114300" imgH="127000" progId="Equation.DSMT4">
+                <p:oleObj spid="_x0000_s32712" name="Equation" r:id="rId3" imgW="114300" imgH="127000" progId="Equation.DSMT4">
                   <p:embed/>
                 </p:oleObj>
               </mc:Choice>
@@ -11777,7 +11756,7 @@
           <a:graphicData uri="http://schemas.openxmlformats.org/presentationml/2006/ole">
             <mc:AlternateContent xmlns:mc="http://schemas.openxmlformats.org/markup-compatibility/2006">
               <mc:Choice xmlns:v="urn:schemas-microsoft-com:vml" Requires="v">
-                <p:oleObj spid="_x0000_s32700" name="Equation" r:id="rId5" imgW="114300" imgH="127000" progId="Equation.DSMT4">
+                <p:oleObj spid="_x0000_s32713" name="Equation" r:id="rId5" imgW="114300" imgH="127000" progId="Equation.DSMT4">
                   <p:embed/>
                 </p:oleObj>
               </mc:Choice>
@@ -12064,7 +12043,7 @@
           <a:graphicData uri="http://schemas.openxmlformats.org/presentationml/2006/ole">
             <mc:AlternateContent xmlns:mc="http://schemas.openxmlformats.org/markup-compatibility/2006">
               <mc:Choice xmlns:v="urn:schemas-microsoft-com:vml" Requires="v">
-                <p:oleObj spid="_x0000_s32701" name="Equation" r:id="rId7" imgW="114300" imgH="127000" progId="Equation.DSMT4">
+                <p:oleObj spid="_x0000_s32714" name="Equation" r:id="rId7" imgW="114300" imgH="127000" progId="Equation.DSMT4">
                   <p:embed/>
                 </p:oleObj>
               </mc:Choice>
@@ -12117,7 +12096,7 @@
           <a:graphicData uri="http://schemas.openxmlformats.org/presentationml/2006/ole">
             <mc:AlternateContent xmlns:mc="http://schemas.openxmlformats.org/markup-compatibility/2006">
               <mc:Choice xmlns:v="urn:schemas-microsoft-com:vml" Requires="v">
-                <p:oleObj spid="_x0000_s32702" name="Equation" r:id="rId8" imgW="114300" imgH="127000" progId="Equation.DSMT4">
+                <p:oleObj spid="_x0000_s32715" name="Equation" r:id="rId8" imgW="114300" imgH="127000" progId="Equation.DSMT4">
                   <p:embed/>
                 </p:oleObj>
               </mc:Choice>
@@ -12514,7 +12493,7 @@
           <a:graphicData uri="http://schemas.openxmlformats.org/presentationml/2006/ole">
             <mc:AlternateContent xmlns:mc="http://schemas.openxmlformats.org/markup-compatibility/2006">
               <mc:Choice xmlns:v="urn:schemas-microsoft-com:vml" Requires="v">
-                <p:oleObj spid="_x0000_s32703" name="Equation" r:id="rId9" imgW="114300" imgH="127000" progId="Equation.DSMT4">
+                <p:oleObj spid="_x0000_s32716" name="Equation" r:id="rId9" imgW="114300" imgH="127000" progId="Equation.DSMT4">
                   <p:embed/>
                 </p:oleObj>
               </mc:Choice>
@@ -12567,7 +12546,7 @@
           <a:graphicData uri="http://schemas.openxmlformats.org/presentationml/2006/ole">
             <mc:AlternateContent xmlns:mc="http://schemas.openxmlformats.org/markup-compatibility/2006">
               <mc:Choice xmlns:v="urn:schemas-microsoft-com:vml" Requires="v">
-                <p:oleObj spid="_x0000_s32704" name="Equation" r:id="rId10" imgW="114300" imgH="127000" progId="Equation.DSMT4">
+                <p:oleObj spid="_x0000_s32717" name="Equation" r:id="rId10" imgW="114300" imgH="127000" progId="Equation.DSMT4">
                   <p:embed/>
                 </p:oleObj>
               </mc:Choice>
@@ -12631,11 +12610,7 @@
             </a:r>
             <a:r>
               <a:rPr lang="en-US" dirty="0" smtClean="0"/>
-              <a:t> = </a:t>
-            </a:r>
-            <a:r>
-              <a:rPr lang="en-US" dirty="0" smtClean="0"/>
-              <a:t>2</a:t>
+              <a:t> = 2</a:t>
             </a:r>
           </a:p>
           <a:p>
@@ -12681,11 +12656,7 @@
             </a:r>
             <a:r>
               <a:rPr lang="en-US" dirty="0" smtClean="0"/>
-              <a:t> = </a:t>
-            </a:r>
-            <a:r>
-              <a:rPr lang="en-US" dirty="0" smtClean="0"/>
-              <a:t>9</a:t>
+              <a:t> = 9</a:t>
             </a:r>
           </a:p>
           <a:p>
@@ -12731,11 +12702,7 @@
             </a:r>
             <a:r>
               <a:rPr lang="en-US" dirty="0" smtClean="0"/>
-              <a:t> = </a:t>
-            </a:r>
-            <a:r>
-              <a:rPr lang="en-US" dirty="0" smtClean="0"/>
-              <a:t>3</a:t>
+              <a:t> = 3</a:t>
             </a:r>
           </a:p>
           <a:p>
@@ -12860,11 +12827,7 @@
             </a:r>
             <a:r>
               <a:rPr lang="en-US" b="1" dirty="0" smtClean="0"/>
-              <a:t>      </a:t>
-            </a:r>
-            <a:r>
-              <a:rPr lang="en-US" b="1" dirty="0" smtClean="0"/>
-              <a:t>Y-</a:t>
+              <a:t>      Y-</a:t>
             </a:r>
             <a:r>
               <a:rPr lang="en-US" b="1" dirty="0" err="1" smtClean="0"/>
@@ -13246,11 +13209,7 @@
             </a:r>
             <a:r>
               <a:rPr lang="en-US" b="1" dirty="0" smtClean="0"/>
-              <a:t>      </a:t>
-            </a:r>
-            <a:r>
-              <a:rPr lang="en-US" b="1" dirty="0" smtClean="0"/>
-              <a:t>Id-</a:t>
+              <a:t>      Id-</a:t>
             </a:r>
             <a:r>
               <a:rPr lang="en-US" b="1" dirty="0" err="1" smtClean="0"/>
@@ -13539,13 +13498,8 @@
             </a:pPr>
             <a:r>
               <a:rPr lang="en-US" sz="2400" dirty="0" smtClean="0"/>
-              <a:t>1   0     1   2   5   </a:t>
-            </a:r>
-            <a:r>
-              <a:rPr lang="en-US" sz="2400" dirty="0" smtClean="0"/>
-              <a:t>4</a:t>
-            </a:r>
-            <a:endParaRPr lang="en-US" sz="2400" dirty="0" smtClean="0"/>
+              <a:t>1   0     1   2   5   4</a:t>
+            </a:r>
           </a:p>
           <a:p>
             <a:pPr marL="457200" indent="-457200">
@@ -13553,13 +13507,8 @@
             </a:pPr>
             <a:r>
               <a:rPr lang="en-US" sz="2400" dirty="0" smtClean="0"/>
-              <a:t>1   0     2   3   6   </a:t>
-            </a:r>
-            <a:r>
-              <a:rPr lang="en-US" sz="2400" dirty="0" smtClean="0"/>
-              <a:t>5</a:t>
-            </a:r>
-            <a:endParaRPr lang="en-US" sz="2400" dirty="0" smtClean="0"/>
+              <a:t>1   0     2   3   6   5</a:t>
+            </a:r>
           </a:p>
           <a:p>
             <a:pPr marL="457200" indent="-457200">
@@ -13567,38 +13516,13 @@
             </a:pPr>
             <a:r>
               <a:rPr lang="en-US" sz="2400" dirty="0" smtClean="0"/>
-              <a:t>1   </a:t>
-            </a:r>
+              <a:t>1   0     4   5   8   7</a:t>
+            </a:r>
+          </a:p>
+          <a:p>
             <a:r>
               <a:rPr lang="en-US" sz="2400" dirty="0" smtClean="0"/>
-              <a:t>0     </a:t>
-            </a:r>
-            <a:r>
-              <a:rPr lang="en-US" sz="2400" dirty="0" smtClean="0"/>
-              <a:t>4   5   8   </a:t>
-            </a:r>
-            <a:r>
-              <a:rPr lang="en-US" sz="2400" dirty="0" smtClean="0"/>
-              <a:t>7</a:t>
-            </a:r>
-            <a:endParaRPr lang="en-US" sz="2400" dirty="0" smtClean="0"/>
-          </a:p>
-          <a:p>
-            <a:r>
-              <a:rPr lang="en-US" sz="2400" dirty="0" smtClean="0"/>
-              <a:t>4     1  </a:t>
-            </a:r>
-            <a:r>
-              <a:rPr lang="en-US" sz="2400" dirty="0" smtClean="0"/>
-              <a:t>0     </a:t>
-            </a:r>
-            <a:r>
-              <a:rPr lang="en-US" sz="2400" dirty="0" smtClean="0"/>
-              <a:t>5   6   9   </a:t>
-            </a:r>
-            <a:r>
-              <a:rPr lang="en-US" sz="2400" dirty="0" smtClean="0"/>
-              <a:t>8</a:t>
+              <a:t>4     1  0     5   6   9   8</a:t>
             </a:r>
             <a:endParaRPr lang="en-US" sz="2400" dirty="0"/>
           </a:p>

</xml_diff>